<commit_message>
Annotations on IP Slides
</commit_message>
<xml_diff>
--- a/The Internet Protocol.pptx
+++ b/The Internet Protocol.pptx
@@ -10,12 +10,13 @@
     <p:sldId id="258" r:id="rId4"/>
     <p:sldId id="259" r:id="rId5"/>
     <p:sldId id="262" r:id="rId6"/>
-    <p:sldId id="261" r:id="rId7"/>
-    <p:sldId id="263" r:id="rId8"/>
-    <p:sldId id="264" r:id="rId9"/>
-    <p:sldId id="265" r:id="rId10"/>
-    <p:sldId id="260" r:id="rId11"/>
-    <p:sldId id="266" r:id="rId12"/>
+    <p:sldId id="267" r:id="rId7"/>
+    <p:sldId id="261" r:id="rId8"/>
+    <p:sldId id="263" r:id="rId9"/>
+    <p:sldId id="264" r:id="rId10"/>
+    <p:sldId id="265" r:id="rId11"/>
+    <p:sldId id="260" r:id="rId12"/>
+    <p:sldId id="266" r:id="rId13"/>
   </p:sldIdLst>
   <p:sldSz cx="12192000" cy="6858000"/>
   <p:notesSz cx="6858000" cy="9144000"/>
@@ -122,6 +123,103 @@
 </p:presentation>
 </file>
 
+<file path=ppt/ink/ink1.xml><?xml version="1.0" encoding="utf-8"?>
+<inkml:ink xmlns:inkml="http://www.w3.org/2003/InkML">
+  <inkml:definitions>
+    <inkml:context xml:id="ctx0">
+      <inkml:inkSource xml:id="inkSrc0">
+        <inkml:traceFormat>
+          <inkml:channel name="X" type="integer" max="3840" units="cm"/>
+          <inkml:channel name="Y" type="integer" min="-1080" max="2160" units="cm"/>
+          <inkml:channel name="T" type="integer" max="2.14748E9" units="dev"/>
+        </inkml:traceFormat>
+        <inkml:channelProperties>
+          <inkml:channelProperty channel="X" name="resolution" value="43.73576" units="1/cm"/>
+          <inkml:channelProperty channel="Y" name="resolution" value="66.80412" units="1/cm"/>
+          <inkml:channelProperty channel="T" name="resolution" value="1" units="1/dev"/>
+        </inkml:channelProperties>
+      </inkml:inkSource>
+      <inkml:timestamp xml:id="ts0" timeString="2020-12-09T15:19:05.453"/>
+    </inkml:context>
+    <inkml:brush xml:id="br0">
+      <inkml:brushProperty name="width" value="0.05292" units="cm"/>
+      <inkml:brushProperty name="height" value="0.05292" units="cm"/>
+      <inkml:brushProperty name="color" value="#FF0000"/>
+    </inkml:brush>
+  </inkml:definitions>
+  <inkml:trace contextRef="#ctx0" brushRef="#br0">2628 1111 0,'0'18'219,"0"0"-204,0-1-15,0 18 16,0 1 0,0-19-1,0 1-15,0 0 16,0-1 0,18 1-16,-18 0 31,0-1-16,17 1 17,-17-1-17,0 1-15,0 0 16,0-1 0,0 1-1,0 0 1,0-1 15,0 1-15,18 0-1,-18-1 1,0 1 15,0 17 0,0-17-15,0 17 0,0 0-1,0-17-15,0 0 16,0-1-16,0 1 16,0 0-1,0 17 1,0-18 15,18 19-15,-18-19-1,0 1 1,17 0-16,-17-1 31,0 19-31,0-19 16,0 1-16,0-1 15,0 1-15,0 0 16</inkml:trace>
+  <inkml:trace contextRef="#ctx0" brushRef="#br0" timeOffset="2053.39">2999 1147 0,'17'-18'47,"1"18"-16,0 0-15,17 0 15,-18 0-15,1 0 0,17 0-1,-17 0 1,0 0-16,-1 0 15,1 0-15,0 0 16,-1 0-16,18 0 16,-17 0-16,0 0 15,-1 18 1,-17-1 0,18-17 15,17 0-16,-17 0-15,0 18 16,-1-1 15,1 1-31,-1-18 16,19 53 0,-19-53-16,-17 18 15,0-1-15,0 54 16,18-71-16,0 17 15,-18 1 1,0 0 0,0-1-16,0 1 15,0 35-15,0-18 16,0-17 0,0-1-16,0 19 15,0 17-15,0-18 0,0 0 16,0 1-1,-36-1-15,1 18 16,0-18-16,17 18 16,1-35-1,17-1-15,-18-17 16,18 18 0,-18-1-1,1-17 1,17 18-1,-18 0 1,0-18 15,1 0-15,-1 0 15,-17 0-31,17-18 16,1 0 15,17 1-15,0-18-1,0-1-15,0 19 16,0-19-16,0 1 16,0 17-1,0-17 63,0 18-62,70 17 0,-52-36-1,-1 36-15,1 0 16,17 0-1,1 0 1,-19 0 0,1 0-16,-1 0 47,19 18-32,-19 0-15,1-1 31,0 1-15,-1-1-16,1 1 78,0-18-78,-1 0 47,1 18 16,0-18-32,-1 0 0,18 0-15,-17 0-16,0 0 15</inkml:trace>
+  <inkml:trace contextRef="#ctx0" brushRef="#br0" timeOffset="5048.89">4851 1041 0,'-36'0'78,"1"-18"-62,17 0-16,1 18 15,-36 0 1,0 0-16,35 0 0,1 0 16,-1 0-1,0 0-15,-17 0 16,18 0-16,-1 0 16,-35 0-16,0 0 15,35 0-15,-52 0 16,52 0-16,-17 0 15,-18 0-15,35 0 16,1 0-16,-1 0 16,0 0-1,-17 0 1,18 0 0,-1 0-16,0 0 0,1 0 15,-36 0-15,35 18 16,0-18-1,1 0-15,-18 18 16,17-18 0,0 17 15,18 19-15,0-1-1,0-17 16,0-1-15,0 1-16,0-1 16,0 1 15,18 0-15,-18-1-16,18-17 0,34 18 15,1 35-15,53-35 31,-71-1-31,1 1 16,17-18-16,-18 17 16,-35 1-16,35-18 15,-17 0-15,0 0 16,-1 18 0,1-18-16,52 0 15,-52 0 1,17 0-16,-17 0 15,52 0 1,-52 0-16,35 0 16,-35 0-1,-1 0-15,1 0 0,0 0 16,17 0-16,-18 0 16,1 0 15,0 0-31,-1 0 15,19 0 1,-1 0 0,-17 0-1,-18 17-15,35-17 16,-35 18-16,18-18 0,-1 18 31,1 17-15,-1 0-1,-17-17 1,0-1 0,0 19-1,0-19 1,0 1 0,0 0-1,0-1-15,0 19 16,0-19-1,-52 36 1,16-53 15,1 18-15,-18-1-16,35-17 16,1 0-1,-19 0-15,1 0 16,18 0-16,-19 0 31,19 0-31,-19 0 0,19 0 16,-19 0-16,19 0 15,-18 0 1,-1 18-16,19-18 0,-19 18 16,19-18-1,-1 0 126,36-18-94,-18 0-32,17 1-15,1-1 0,-18-17 16,18 17-16,-1 1 16,-17-1-1,36 0-15,-36-17 0,17 35 16,-17-18-16,18 1 15,-18-1 1,0 0-16,17-17 0,-17 0 31,18 17-15,-18 1 0,18-19-1,-1 36 1,-17-17-16,18-1 31,-18 0-15,0 1-1,18-1-15,-18 1 16,17 17 0,-17-18-16,18-17 0,0 17 15,-1 18 1,-17-18-16,18 18 47,-18-17-16,0-1-15,0 0-1,17 18 32,-17-17 62,0-1-93,0-17 0,18 35-1</inkml:trace>
+  <inkml:trace contextRef="#ctx0" brushRef="#br0" timeOffset="12540.6">6685 952 0,'0'18'140,"0"0"-124,0 17 0,0-17-1,0-1-15,0 1 0,0 0 16,0 17 0,0 0-1,0-17-15,0 17 47,0-17-31,0-1-1,0 19 17,0-19-17,0 1 1,0 0-1,0-1-15,0 1 0,0 17 16,0 0 0,0-17-1,0 0 1,0-1-16,0 1 16,0 17-1,0-17 1,0-1-1,0 1 1,0 0 0,0-1-16,0 1 31,0 0-15,0-1-16,0 1 15,0 0-15,0-1 16,0 1-1,0 0 1,0-1-16,0 1 94,0-1-32,0 1 79,0 0-79,0-1-30,0 1 93</inkml:trace>
+  <inkml:trace contextRef="#ctx0" brushRef="#br0" timeOffset="21220.95">8925 988 0,'0'17'94,"0"19"-79,0-1-15,0-17 0,0-1 16,0 19-16,18-19 16,-18 1-16,0-1 15,0 1 1,0 17-16,0-17 0,0 0 16,0 17-1,0-17 1,0-1-16,0 1 15,0 17 1,0-17-16,0-1 16,0 1-16,0 0 15,18-1-15,-18 1 16,0 0 0,0-1-16,0 1 15,0-1 1,0 1-1,0 0 1,0-1-16,0 1 16,0 0-1,0-1-15,0 1 16,0 0 0,0-1-1,0 1 1,0 0-16,0-1 62,0 1-30,0-1-17,0 1 1,0 0 62</inkml:trace>
+  <inkml:trace contextRef="#ctx0" brushRef="#br0" timeOffset="22885.05">9349 1041 0,'0'17'93,"0"1"-77,0 0-16,0 17 0,-18-17 16,18-1-16,0 54 15,0-36 1,0-17-16,0-1 0,0 19 15,0-1-15,0 0 16,0 18 0,0-35-16,0 35 31,0-36-15,0 1-16,0-1 15,0 19 1,0-19-1,0 19-15,0-19 16,0 19 0,0-19-1,0 19 1,0-19 0,0 36-1,0-35 1,0-1-1,0 1 17,0 0-1,0-1-31,0 1 16,0 0-1</inkml:trace>
+  <inkml:trace contextRef="#ctx0" brushRef="#br0" timeOffset="25529.31">9596 1023 0,'17'0'31,"1"0"-15,-1 0-16,1 0 16,70 0 15,-35 0-31,18 0 15,-1 0 1,-17 0-16,18 0 0,-1 0 16,1 0-16,-1 0 15,-52 18-15,17-18 16,-17 17-16,0-17 16,-1 18-1,-17 0 1,18-18-1,-18 35-15,53-17 16,-36 17 0,-17 0-16,36-17 0,-19-1 15,1 19-15,0-19 16,-18 1 0,17 0-1,-17 17 1,0-18 15,0 19-31,0-19 16,0 1-16,0 0 15,0 17 1,0-17-16,0-1 16,-35 18-1,35 1-15,0-19 16,-18-17-16,1 18 15,-1 0 1,0-1-16,1 1 0,-1 0 16,-17-1-1,-18 19-15,-18-1 16,36 0 0,0-17-1,-18-1-15,35 1 16,1 0-1,17-1 1,-18-17-16,0 0 16,1 18-16,-18-18 15,17 18-15,-17-18 16,-18 17 0,35 1-1,-17-18-15,17 0 16,-17 0-16,0 0 15,17 0 1,0 0-16,1 0 0,-1 0 16,0 0-1,18-18 17,0 1-17,0-36-15,0 35 16,0-17-16,0 17 15,0-17 1,0 0 0,0-18-16,0 17 15,18 19 1,17-1-16,-17 0 16,0 18-16,-1 0 15,36-17 1,-35-1-1,-1 18 1,1 0 0,0 0-16,-1 0 15,1 0 1,0 0-16,-1 0 0,1 0 47,0 0-32,-1 18 17,1-1-17,-1-17-15,-17 18 16,18 0 0,0-1-1,-1 19-15,1-19 16,0-17-1,-1 18-15,-17 0 16,18 17 0,17-18-1,-17 1 1,17 0-16,-17-1 16,-1 1-16,1 17 15,0-35 16,17 18 1,-17 17-17,-1-35 1,1 18-16,17-1 16,0 1-1,-35 0-15,36-1 0,-19-17 16,-17 18-1,18 0 1,0-18 0,-1 0-1,-17 17 63,0 1-62</inkml:trace>
+  <inkml:trace contextRef="#ctx0" brushRef="#br0" timeOffset="30609.11">3739 2575 0,'-17'0'63,"-1"0"-48,1 0 1,-1 0 0,0 0-1,1 0 1,-19 0-16,19 0 0,-19 0 31,19 0 0,-19 0 16,19 0-31,-36 36 0,35-36-1,-17 52-15,35-34 16,-18-18-1,1 35-15,-1 1 0,18-1 16,-18-17 0,18-1-1,0 18-15,0 1 0,0-19 16,0 1-16,0 0 16,0 17-1,0-17-15,0 17 16,0 0-1,0-17 17,0 17-17,0-17 1,18-18 0,-18 35-1,0 0 1,18 1-1,-18-19 1,0 1-16,17-1 16,1-17-1,-18 18-15,18-18 16,-18 18-16,0-1 16,17-17-1,19 18-15,-36 0 0,35-1 16,-18-17-16,1 36 15,35-19 1,-35-17-16,52 18 16,-52-1-16,17-17 31,0 18-31,-17-18 16,0 18-1,-1-18-15,1 0 31,35 0-15,-35 0-16,-1 0 31,1 0-15,-1 0-16,1 0 16,0 0-16,-1 0 15,1-18 1,0 0 15,-18 1-15,0-18-1,0 17 1,0 0 0,0 1-1,0-1 1,0 0-16,0 1 15,0-19 1,-18 19 0,18-18-1,-35 17 1,17 0-16,0-17 16,-17 0-1,18 17 1,-1 18-1,0-18-15,1 1 16,-1 17 62,0 0-62,18-18-16,-17 18 62,-1 0-62,0 0 32,-17 18-17,18-18 16,17 17-15,-18-17 0,-17 36 15,-1-19-15,19 1-1,17 0 1,-18-1-16,0 1 31,1-18-15,17 18-1,-18-18 1,0 0 0,1 0 46,17 17-62,-18-17 16,1 0-16,-19 35 15,19-35-15</inkml:trace>
+  <inkml:trace contextRef="#ctx0" brushRef="#br0" timeOffset="32448.85">4498 2593 0,'0'18'78,"0"-1"-62,0 18-1,0-17-15,0 0 16,0-1 0,0 19-16,0-1 15,0-17 1,0-1-16,0 1 15,0-1 17,0 19-17,0-19-15,0 1 0,0 17 16,-18-17-16,18 0 16,0-1-1,0 1 32,18-18 187,0 0-202,17 0-17,-18 0 1,19 0-16,-19 0 31,19 0-15,-19 0-1,1 0 1,0 0 47,-1 0-63,1 0 31,-1 0-16,19 0-15,-19 18 16,1-18-16,17 17 16</inkml:trace>
+  <inkml:trace contextRef="#ctx0" brushRef="#br0" timeOffset="33981.44">4904 2663 0,'-36'0'47,"19"18"-32,17 17 1,0-17 0,-18 17-16,18 1 15,0-1 1,0-18-16,-18 19 0,18-19 15,0 19-15,0-19 16,0 1-16,0 35 31,0-35-15,0 17 0,0-18-1,0 1 1,0 0-1,0-1-15,0 19 16,0-1 0,0-17-16,0-1 0,0 1 31,0-1-15,0 1-16,0 0 0,0-1 15,0 1 1,0 0-1,0-1 1,0 19 0,0-19-1,0 1 17,0-1-17,0 1-15,0 0 47,0-1-16</inkml:trace>
+  <inkml:trace contextRef="#ctx0" brushRef="#br0" timeOffset="38513.66">6667 2452 0,'18'0'78,"-36"35"-63,18-17 1,-35 17 0,35 0 46,0-17-46,0 0-1,0-1 17,0 1-32,0-1 31,0 1-16,0 0 1,0-1 0,0 1-16,0 0 31,0-1-15,0 1-1,0 17-15,0-17 16,18 17-1,-18-17 1,0-1 0,17-17 46,-17 18-46,0 0-16,18-1 31,-18 1-15,18 17-1,-18-17 1,0 0 0,0-1-16,17-17 15,-17 18-15,0 17 16,18-17-1,0 17-15,-18-17 16,0-1 0,0 1-16,17 17 0,1-17 15,-18-1-15,0 1 16,0 0 0,0-1-1,0 1 1,18 0-1,-18 17-15,0-17 16,0-1 0,0 1-1,0-1 17,0 1-17,0 0 1,0-1-16,0 1 15,0 0 17,0-1 30,0 1 1,0 0-48,0-1-15,0 1 63,0 0-48</inkml:trace>
+  <inkml:trace contextRef="#ctx0" brushRef="#br0" timeOffset="47977.36">9525 2593 0,'-18'0'79,"1"0"-64,-1 0 16,-17 0-15,0 0 0,17 0-16,0 0 15,1 0 1,-1 0-16,-17 0 0,17 0 16,0 0-1,1 0 16,-19 0-31,19 0 16,-18 0-16,-1 0 0,1 18 16,17-18-16,1 0 15,-1 0 1,18 17 171,0 18-171,0-17 0,0 0-16,0-1 15,0 1 1,0 0-16,0 17 0,0-17 16,0-1-1,0 1 1,0-1-16,0 1 15,0 0 17,0-1-17,0 1-15,0 17 32,-53 18-17,53-17-15,0-19 47,-17 1-31,17-1 31,-18 1 15,36-18-31,17 0 1,-18 0-32,1 0 15,0 0 1,-1 0-1,19 0 1,-1 0 0,0 0-1,-17 0-15,-1 0 16,1 0 0,0 0-1,-1 0 1,1 0-16,0 0 31,-1 18-15,-17-1 15,18-17-31,17 0 31,-17 18-15,0 0-1,-1 17 17,1 0-32,17-17 62,-35-1-46,0 1-16,18 0 15,-18-1-15,0 1 16,0 0 0,0-1-1,0 19 1,0-19 0,0 18-16,0-17 0,0 17 15,-18-35-15,18 36 16,-18-19-1,1-17 1,-1 0 0,1 18-16,-19 0 0,1-1 15,0 19-15,-36-19 16,18 18 0,0-17-16,-17 0 0,17-1 15,35-17 16</inkml:trace>
+  <inkml:trace contextRef="#ctx0" brushRef="#br0" timeOffset="50716.95">10319 2611 0,'-18'0'0,"-35"0"15,36 0-15,-1 0 16,0 0-1,1 0 1,-1 0 0,-17 0-16,-1 0 15,-16 0 1,-19 0-16,36 0 16,-18 0-1,0 17-15,0 1 16,0-1-16,35-17 15,-35 18-15,36-18 16,-18 35 47,35-17-48,0 17 16,0-17-15,0 0 0,0-1-1,0 1 1,0-1 0,0 19-16,17-1 15,-17-17-15,35-1 16,-35 1-1,36 0-15,-19-18 16,1 0 0,17 0-1,36 17 1,-36 1 0,-17-18-1,-1 0 1,1 0-1,0 18 1,-1-18-16,1 0 0,35 0 16,-35 17-1,-1-17-15,18 0 16,-17 0 0,0 0-16,-1 18 15,1-18-15,17 35 16,18-35 15,-35 18-15,-18-1 31,0 19-16,0-19-16,17-17 1,-17 18-16,18 0 16,-18 17-1,0-18 1,18 1-16,-18 17 16,0-17-16,0 17 15,0-17-15,0 0 16,0-1-1,0 18-15,0-17 16,0 0 15,0-1-15,0 1 0,0 0-16,-36-1 15,19 1 16,-1-18-15,-17 0-16,0 0 16,-1 0-1,-17 18-15,1-18 0,-19 0 16,18 0 0,35 0-16,-17 0 15,17 0-15,1 0 16,-1 0-16,1-18 15,-1 0 1,18 1 0,0-1-1,0-17 1,0-1 0,0 19-1,0-1 1,0 1-16,18-36 15,-18 35-15,17 0 16,18-17 0,1-18-16,-36 0 0,35 36 15,-35-1-15,35 18 16,-17-18-16,0 18 16,-18-17-16,17-1 15,1 0 1,17-17-1,-35 18 1,18-1-16,-1 0 16,1 1-1,-18-1 17,18 18-17,-18-18 1,17 1-16,-17-1 15,18 0-15,0 18 16,-1-17 0,-17-1-16,0 0 15,0 1 1,0-1 0,18 1-1,-18-1 16,0 0-15,0 1-16,0-1 16,0 0 15,18-17 16,-18 17-47,0 1 31,35-1-15</inkml:trace>
+  <inkml:trace contextRef="#ctx0" brushRef="#br0" timeOffset="53457.2">3263 4057 0,'35'0'78,"18"0"-63,-35 0 1,0 0 0,-1 0-16,1 0 15,0 0 1,-1 0-16,18 18 16,-17-18-1,0 0-15,-1 0 0,36 0 31,-17 35-15,-19-35-16,1 0 31,17 17-15,-17 1 0,-18 0-1,17-18-15,1 17 16,0 1 15,-18 0-15,0-1-16,0 1 15,0 0 1,0-1 0,0 1-16,0 0 15,0-1 48,-18-17-16,0 18-47,-34-18 15,16 0-15,19 0 16,-36 0-16,17 17 15,1-17-15,17 0 16,-17 0-16,18 0 63,-1 0-32,0 0-31,18 18 94,18-18-63,0 0-31,17 18 15,-18-18-15,1 0 16,-18 17-16,18-17 16,35 18-1,-36-18 1,1 0-16,0 18 16,-1-18-16,19 0 15,-19 17 16,1-17 16,-18 18-31,17-18-16,1 18 16,-18-1 15,0 18 0,0-17-31,0 0 31,0-1-15,0 1-16,0 0 16,0-1-1,-18 1-15,1 0 16,-1 17-1,1-35 17,-19 17-17,1-17-15,-18 18 16,35-18 0,1 18-16,-36-18 15,35 0 1,1 0 15,-1 0-15,-17 0-1,-71 17-15,53-17 16,35 0-16,-17 0 16,-18 0-1,35 0 1</inkml:trace>
+  <inkml:trace contextRef="#ctx0" brushRef="#br0" timeOffset="55959.47">4516 3951 0,'35'18'93,"-35"-1"-77,17 1 0,-17 0-1,0-1 1,18 19-1,0-19-15,-18 1 16,17-1 0,19 19-1,-19-19 48,1-17-48,-18 18 1,18-18 0,-18 18-16,17-1 15,18-17 1,-17 36-16,0-36 0,-18 17 16,35 19-16,18 16 15,-35 1 1,-1-53-16,1 36 15,0-19 1,-18 1-16,0 0 0,17-1 31,-17 1-15,0-1 0,0 1-16,0 0 15,0-1 16,0 1-31,-35 35 16,-18-18 0,18-35-16,-1 18 15,19 17-15,-36-17 16,35-18-16,1 17 16,-1-17-1,-17 0-15,17 0 16,0 0 15,-17 0-15,0 0-1,0 0 1,17 0 0,0 0-16,1 0 0,-19 0 15,19 0-15,-1 0 16,18-35 46,0 17-46,0 1 0,0-1-16,0 1 46,0-1-30,18 0 0,-1 18-1,1-17-15,0 17 32,-1 0-17,1 0 1,-18-18-1,18 18 1,17 0 0,-18 0 93,1 0-93,0 0 15,-1 0-15,19 18-1,-19-1 1,1-17-1,0 18-15,17-18 16,-18 18-16,1-18 16,0 17-16,-1-17 15,1 18 1,35-18 15,-18 0-15,-17 17-1,17-17-15,-17 0 16,-1 18-16,19-18 31,-36 18-31,17-18 16,1 0-16,0 17 31,-18 1-15,17-18 31,1 0 109,-18 18-140</inkml:trace>
+  <inkml:trace contextRef="#ctx0" brushRef="#br0" timeOffset="57453.45">6791 4022 0,'0'17'46,"0"1"-30,0 35 0,0-36-16,-18 19 15,18-19 1,0 1-16,-17 0 16,17-1-16,-18 1 15,18 17-15,-18-17 16,18 17-1,0 0 1,0 1-16,0-19 16,0 1-1,0 0 17,0-1-32,0 1 0,-17 0 15,17-1 1,0 1-16,0-1 15,0 1 1,0 0-16,0-1 16,0 1-16,0 0 15,0 17 1,0-17 0,0 17-1,0-18 1,0 1 46,0 17-15</inkml:trace>
+  <inkml:trace contextRef="#ctx0" brushRef="#br0" timeOffset="62021.52">9031 4322 0,'35'0'125,"18"0"-109,0 0-16,0 0 16,18 17-16,-36-17 15,-17 18-15,-1-18 16,1 17-16,17-17 15,0 18 1,-17-18-16,0 18 0,-1-18 31,1 0-15,0 0-16,-1 0 16,-17 17-1,36-17-15,-1 53 16,-18-35-1,1-18 1,-18 18 0,0-1-1,0 1-15,0 17 16,0-17 0,-18 17-16,1 0 0,-18 1 15,17-19 1,-35 1-16,53-1 15,-18-17-15,-17 36 16,17-36-16,-17 17 16,18-17-16,-1 18 15,18 0 1,-18-18-16,1 35 0,-1-35 16,0 0-16,18 18 31,-17-18-16,-1 0 64,0-18-64,18 0 1,0 1-16,0-1 31,0 0-31,0 1 0,0-19 16,0 1-16,0 0 15,-35 17-15,35 1 16,0-1-16,0 0 16,18 18 155,17 18-155,18 35-16,-35-35 16,35 34-1,-53-34-15,35 0 16,-18-18-16,1 17 16,0-17-16,-18 18 15,17-18 63,1 18-62,17-1 0,-17-17-1,-18 18 1,35 0 15,-17-1 0,17-17 32,0 0-48,-17 0 1</inkml:trace>
+  <inkml:trace contextRef="#ctx0" brushRef="#br0" timeOffset="64249.63">10266 4092 0,'-35'0'15,"17"0"1,18 18-16,-53-18 0,0 17 16,35-17-16,-34 18 15,16-18-15,1 18 16,17-1 0,-35 1-1,36 17 1,-1-35-1,0 36 1,1-36-16,17 17 0,-35 19 16,35-19-1,-18 1 1,18-1-16,-18 19 16,18-19-16,0 1 15,0 0-15,0-1 16,0 1-1,0 0 1,0-1-16,0 18 16,0-17-1,0 17 1,0-17 0,0 0-1,0-1-15,18-17 16,0 0-1,-18 18 1,17 0 0,1-1-1,-18 1 1,17-18-16,19 17 16,-19-17-16,1 18 31,0-18-16,-1 0 1,36 18-16,-35-18 16,0 0-16,-1 0 15,1 17 1,-1-17 46,1 0-46,0 0 0,17 0 15,-17-17 16,-18-1-32,0 0-15,0-17 16,0 0 0,0 17-16,0 1 47,-18 17-16,-35-18 0,35 18-15,1 0-1,17-18 1,-18 18 15,-17 0-15,17 0 62,1 0-62,-19 0-1,19 0 32,-1 0-31,0 0 31,1 18-1,17 0 17,0-1-47,-18 1 46</inkml:trace>
+  <inkml:trace contextRef="#ctx0" brushRef="#br0" timeOffset="66025.96">3563 5433 0,'0'17'78,"0"1"-63,0 17-15,18 1 0,-18 17 16,17-1-16,-17-34 16,18 53-1,-18-54-15,0 1 0,0 0 16,0-1-1,35 18-15,-35-17 16,0 0 0,0-1-16,0 19 15,0-19-15,0 1 16,0 0-16,0 34 16,0-34-1,0 0 1,0-1-16,0 1 0,0 0 15,0-1-15,0 1 16</inkml:trace>
+  <inkml:trace contextRef="#ctx0" brushRef="#br0" timeOffset="68078.31">4639 5592 0,'-35'0'109,"17"0"-93,-52 0 0,52 0-1,-35 35-15,0 0 16,18-17-16,17-18 15,1 17-15,-19 1 16,19 0 0,-1-18-1,0 0-15,18 17 0,-17 1 16,17 0-16,0-1 16,-36 18-1,36-17 1,-17 0-16,-1 17 15,18-17 1,0-1 0,0 1-16,0 0 0,0-1 15,0 36-15,0-35 16,0 35 0,0-36-16,0 1 15,0 0-15,0-1 0,0 1 31,0 17-31,35-35 0,-17 18 16,0-18 0,17 0-1,36 35-15,-54-35 16,1 18-16,-1-18 16,1 0-16,0 17 15,17-17-15,0 0 16,-17 0-1,0 0-15,-1 0 16,1 0 0,-1 0-16,1 0 31,17 0-15,1 0-1,-19 0-15,19 0 16,-19-17-16,1 17 15,-1 0-15,-17-18 16,18 0 0,17 1 93,-35-1-93,0 1 15,-17-1-15,-1 0-1,18 1 1,-53 17 15,36 0-15,-1-18-16,0 18 15,1-18 1,-1 18 0,-17-17-1,17 17-15,0 0 16,1 0-1,-1 0 1,-35-18 0,36 18-1,-1 0-15,18-18 0,-18 18 16,1 0-16,-1 0 16,0 0-1,-17 0 1,0 0-1,17 0 1,1 0 15</inkml:trace>
+  <inkml:trace contextRef="#ctx0" brushRef="#br0" timeOffset="76818.07">8996 2663 0,'17'18'141,"-17"0"-126,0 17 1,0-17 0,0 17-16,0-17 15,0 34 1,-17-16-16,17 17 16,0-18-1,-18 18 1,18-35-1,-17 17-15,-1 0 16,18-17 0,0-1-16,0 1 15,0 0 1,0 17-16,-18 0 0,18 0 16,0-17-1,0 0-15,0 17 16,0-17-1,-35 35 1,35 17-16,0-52 16,0-1-16,-18 19 15,18-19 1,0 1 0,0 0-16,0 17 0,0-17 15,18-36 95,0 18-95,-1-35-15,1 35 16,0-71-16,-1 53 15,18-35-15,-35 18 16,18 0-16,0 17 16,-18 1-1,0-36-15,17 17 0,-17 19 16,0-1-16,0-17 16,0 0-1,18-1-15,-18 19 0,0-19 16,0 1-16,35-35 15,-17 52 1,-18 0-16,0-17 0,0 17 16,0-17-1,0 17 1,0-17-16,0 18 0,0-1 16,0 0-1,0-17 16,0 53 63,0 17-78,-18 18-16,18 17 0,0-52 15,-17 53-15,17 17 16,-18-35 0,0 0-16,18 0 0,-17 17 15,17-52-15,0 17 16,0 36 0,0-36-16,0 0 15,0-17 1,0-1-16,0 1 15,70-124 157,-34 18-172,-19 0 16,1 17-16,35-17 16,-36 0-1,1 0 1,-18 17-16,0 1 15,0 17-15,0 35 0,0 0 16,0-35 0,0 36 46,0 34 16,0 36-62,-18 0-16,1 0 16,17 0-16,0 18 15,0-36-15,0 36 16,0-1-16,0-17 15,0 18-15,0-36 16,0 35-16,0 1 16,0 17-16,-18-17 15,18-18 1,0-36-16,0 1 16,0 0-16,0-1 15,18-34 141,-1-36-140,1 17-16,-18 1 0,18 0 16,-18-18-16,17-18 15,1-17 1,-18 18-16,18-1 0,-18 0 16,17-17-1,1-18 1,-18 53-16,0 36 15,0-1-15,0 1 0,18-1 16,-18-17 0,0 17-16,0 0 15,17 1 1,1-1 0,-18 0 15,-35 71 63,-1-35-79,19 17-15,-19 36 0,36-36 16,-17 0-16,17-17 15,0 35 1,-53 0-16,53 0 0,-18 0 16,0 17-16,1-17 15,17 18 1,0-36-16,-18 36 0,18-19 16,-17-34-16,17 0 15,0-1 1</inkml:trace>
+  <inkml:trace contextRef="#ctx0" brushRef="#br0" timeOffset="78082.46">8361 2575 0,'-35'18'15,"17"0"16,18 34-15,0-34 0,0 0-16,0 17 15,0 18-15,0-35 16,0-1 0,0 1-16,0 17 15,0-17 1,0 17-16,0 0 15,0-17 1,0 0-16,0-1 16,0 1 77,18-18-77,-1 0 0,1 0-16,-1 0 15,1 0-15,0 0 16,-1 0 0,1 0-16,0 0 15,-1 0 1,19 0-16,-1 0 15,-18 0-15,19 0 16,-19 0-16,1 0 16,0 0-1</inkml:trace>
+  <inkml:trace contextRef="#ctx0" brushRef="#br0" timeOffset="79669.21">8731 2663 0,'-17'0'32,"-1"0"-17,18 18 1,0 17-16,0-17 16,0 0-1,0 17-15,0 0 16,0-17-1,0 17-15,0-17 16,0-1-16,0 1 16,0 17-16,0-17 15,0 0 1,0-1-16,0 1 16,0 0-1,0-1 1,0 1-16,0-1 15,0 19 1,0-19-16,0 1 16,-18 0-1,18-1 1,0 1 0,0 0-1,-35-18 1,35 17 15,-18-17-15,18 35-1,0 1 1,0-19 0,-17 19 15,17-19 0,0 1 0,0 0 16,0-1 0,0 1-16,0-1-15,0 1 0,0 0-16,0-1 15,0 1 16,0 0-15,0-1 0,0 1-1</inkml:trace>
+  <inkml:trace contextRef="#ctx0" brushRef="#br0" timeOffset="81973.81">9084 4286 0,'18'0'94,"-18"18"-78,0 0-16,0 17 15,17 0 1,-17 0-1,0-17-15,0 0 16,0 17-16,0 0 16,0-17-16,0 52 15,0-52 1,0 17-16,0-17 16,0 0-16,0-1 15,0 1 1,0-1-16,0 1 15,0 0 1,0-1-16,18-34 78,-18-1-62,0 0-16,18-17 15,-18 18 1,0-54-16,35 18 0,-18 18 16,-17 0-1,0-1-15,53-17 16,-53 36-16,0-19 16,18 19-16,-18-1 78,0 53 0,0-17-63,0 17 1,0 1 0,0-19-1,0 19-15,0 34 0,0-17 16,0 0-16,0 0 16,0-18-1,0-17-15,0 35 0,0-36 16,0 19-1,0-1-15,18 0 16,-18-17-16,0-1 16,17-17 15,19-17 0,-1-18-31,-17 17 16,17-17-16,0-1 15,-17 1-15,-1 17 16,1-35-16,-18 36 16,0-1-16,0 1 15,18-19 1,-18 19-16,0-1 0,17 0 16,-17 1-1,0-1 1,0 0-1,0 1-15,0-1 16,0 1 0,0-19-1,0 19-15,0-1 16,0 0 0,0-17-1,0 17-15,0 1 0,0-1 16,0 36 140,0-1-140,0 1-16,0 17 0,0-17 15,0 0-15,0-1 16,0 1 0,0 0-16,0 17 31,0 0 0,0-17-15,0-1-1,0 1 1,0 0-16</inkml:trace>
+  <inkml:trace contextRef="#ctx0" brushRef="#br0" timeOffset="82986.53">8855 4286 0,'0'18'16,"0"0"-1,0-1 1,0 18-16,0-17 16,0 17-1,0-17 1,-18 17 0,18 18-16,0-35 15,0-1 1,-18 1-1,1 0-15,-1-1 16,18 1 0,0 0-16,-17-1 15,-1 54 1,18-54 62</inkml:trace>
+  <inkml:trace contextRef="#ctx0" brushRef="#br0" timeOffset="84601.78">6244 5327 0,'18'0'47,"-36"0"-32,18 18 32,0-1-31,0 1-16,0-1 15,0 19-15,0-19 16,0 54-16,-17-36 16,-19 18-16,36 0 15,0 0 1,0-18-16,0 1 15,0-1 1,0 0-16,0-17 0,0-1 16,0 19-16,0-19 15,0 1 1,0 0-16,0 17 0,0-18 16,0 1-1,0 0-15,0-1 16,0 1-1,0 0 1,0-1 0</inkml:trace>
+  <inkml:trace contextRef="#ctx0" brushRef="#br0" timeOffset="88197.99">6262 6703 0,'17'0'62,"1"0"-46,-36 0 15,1 0 31,-1 0-46,-17 0 0,17 0-1,-17 17 1,-18-17 46,35 36-46,-17-1-16,0 0 16,0-17-16,17 0 15,0-1-15,1 1 16,-1 17 0,-17-17-16,35-1 15,-18-17-15,18 18 31,0 0-15,0-1-16,0 1 16,0 0-1,0-1 1,0 1 0,0-1-16,0 1 15,0 0-15,0-1 16,0 19-16,18-19 15,-1 1 1,1 0 0,0-18-16,-1 17 15,1-17 1,17 18 0,0-18-16,-35 17 15,36-17-15,-36 18 16,17-18 15,1 0-15,0 0-1,17 0 1,-17 0 0,-1-18 15,1 18-16,-18-17-15,18-1 16,-18 1 0,17-19-16,-17 19 0,18-1 15,-18 0 1,17 1 0,-17-1-16,18-17 15,-18 17-15,18 1 16,-1-1-16,-17 0 15,18-17 1,-18 17 0,0 1-16,18 17 15,-1 0-15,-17-18 16,0 0 0,0 1-16,0-1 15,0 1 48,0-1 46,0 0-93,0 1-1,-17 17 32,-19-18-31,19 18-16,-36-18 15,35 18 1,1 0 0</inkml:trace>
+  <inkml:trace contextRef="#ctx0" brushRef="#br0" timeOffset="90473.13">6191 7620 0,'-17'0'63,"-1"0"-63,-17 0 15,-1 0 1,19 0-16,-1 0 15,0 0 1,18 18 0,-35-18-1,18 0 1,-1 17-16,0 19 16,1-36-1,-1 0-15,-17 35 16,-1-18-16,19-17 15,-1 36-15,1-36 16,-19 17 0,19-17-16,17 18 15,0 0 1,0-1 0,-18-17-1,18 36-15,-18-19 0,18 1 31,0-1-15,0 1 0,0 17-1,0-17-15,0 0 32,0-1-17,0 1-15,18-18 31,17 18-15,-17-1 0,52-17-16,19 53 0,-36-35 15,-18-1-15,35 1 16,19 0-16,-36 17 16,-36-35-1,18 18-15,-17-18 0,0 0 78,-1 0-62,-17-18-16,18-17 31,-18-1-31,0-16 16,0 34-1,0 0 17,0 1-17,0-1 1,0 0-16,0 1 16,0-19-1,0 1 1,0 0-1,-18 35-15,18-53 16,-17 18 15,17 17-15,-18 0 0,18 1 30,-18 17 17,18-18-47,-35 0 171,35 1-187,-17 17 47,17-18-31,-18 18-1,0-17 1,1 17-1</inkml:trace>
+  <inkml:trace contextRef="#ctx0" brushRef="#br0" timeOffset="92525.01">6103 8625 0,'0'-17'16,"-18"-1"0,1 18-1,-1 0 1,-17 0-1,0 0 1,17 0-16,-17 0 16,17 0-1,0 0 1,-17 0 0,17 0-16,1 0 0,-18 0 15,-18 53 16,35-53-31,18 18 16,-18-18 0,18 17-16,-17-17 15,17 18 17,-36-18-17,19 18 1,-1-18-1,18 17 1,0 1-16,0 0 16,0 17-1,0-18-15,0 19 16,0-19 0,0 1-1,0 0 1,0-1-1,0 19 1,0-1-16,0-18 16,18 1-1,-18 0 1,0-1 0,0 1-16,17-18 15,1 18-15,0-1 31,-1 1 1,1-18-17,0 0 1,-1 0 0,1 0-1,0 0 1,17 0-1,-18 0 1,1 0-16,0 0 16,-1 0-1,1 0 17,0 0-32,-1-18 62,1 18-62,0-17 16,-1-1-1,1 18-15,17-35 47,-17 17-31,-18-17-1,17 35 1,1-18 0,-18-17-16,0 17 0,0 1 15,0-1-15,0-17 16,0-18 0,0 18-1,35 35-15,-35-36 16,0 19-1,0-1 1,0 0 31,0 1-31,0-1 15,0-17-16,0 17 1</inkml:trace>
+  <inkml:trace contextRef="#ctx0" brushRef="#br0" timeOffset="94577.97">5980 9437 0,'-18'0'0,"0"0"0,1 0 15,-1 0 1,-17 0-16,17 0 16,-17 0-16,17 0 15,1 0 1,-1 0 15,0 0-15,1 0-16,-1 0 15,-17 17-15,17-17 16,18 18-16,-35-18 16,17 0 46,1 18-46,-1-1-1,0 1-15,18 0 16,-35-18 0,35 17-16,0 1 31,0 0-15,0-1-1,0 1 48,0-1-48,0 1 1,0 0 0,0-1-16,0 1 15,18-18 1,-18 35-1,17-17 1,-17 0 15,18-1-15,0 1-16,-18-1 0,17 1 16,1 0-1,-1-18 1,1 0 31,0 0-32,-1 0 1,1 0 0,0 0-1,-1 0-15,1 0 16,17 0-1,-17 0 1,-1 0 0,1 0-1,0 0-15,17-18 16,-35 0-16,35 1 16,-17-1-1,-18 1 1,0-1-16,18-17 15,-1 35 1,-17-36-16,35 19 0,-35-1 16,0 0-1,0 1 1,0-1 15,0 1-15,0-1-1,0 0-15,0 1 16,0-1 0,0 0 15,0 1 16,0-1 140,0 0-171,0-17-16</inkml:trace>
+</inkml:ink>
+</file>
+
+<file path=ppt/ink/ink2.xml><?xml version="1.0" encoding="utf-8"?>
+<inkml:ink xmlns:inkml="http://www.w3.org/2003/InkML">
+  <inkml:definitions>
+    <inkml:context xml:id="ctx0">
+      <inkml:inkSource xml:id="inkSrc0">
+        <inkml:traceFormat>
+          <inkml:channel name="X" type="integer" max="3840" units="cm"/>
+          <inkml:channel name="Y" type="integer" min="-1080" max="2160" units="cm"/>
+          <inkml:channel name="T" type="integer" max="2.14748E9" units="dev"/>
+        </inkml:traceFormat>
+        <inkml:channelProperties>
+          <inkml:channelProperty channel="X" name="resolution" value="43.73576" units="1/cm"/>
+          <inkml:channelProperty channel="Y" name="resolution" value="66.80412" units="1/cm"/>
+          <inkml:channelProperty channel="T" name="resolution" value="1" units="1/dev"/>
+        </inkml:channelProperties>
+      </inkml:inkSource>
+      <inkml:timestamp xml:id="ts0" timeString="2020-12-09T15:21:40.674"/>
+    </inkml:context>
+    <inkml:brush xml:id="br0">
+      <inkml:brushProperty name="width" value="0.05292" units="cm"/>
+      <inkml:brushProperty name="height" value="0.05292" units="cm"/>
+      <inkml:brushProperty name="color" value="#FF0000"/>
+    </inkml:brush>
+  </inkml:definitions>
+  <inkml:trace contextRef="#ctx0" brushRef="#br0">16192 10178 0,'18'0'15,"-36"0"17,1 0-17,17 17 32,-18 1-31,1 0-1,-19-1 1,19 1 15,17-1-31,0 1 16,-18 0 0,0 17-16,18-17 15,0 17 1,-17 0-16,-1-17 15,18 35 1,-18-36 0,1 1-16,17 0 15,0-1 1,-18 1-16,18 0 0,0 17 31,-17 0-31,-1 18 16,18-18-1,0-17-15,0 0 16,0-1-16,-35 19 16,35 16-1,0-34-15,0 0 16,-18 17 0,0-35-1,1 35 1,-1-17-16,0 0 15,1-18-15,17 17 16,-18-17 62,1 35-62,-1-17-1,18 0 1,0-1 0,-18 1-1,1 0 48,-1-18-48,18 17 1,0 1 0,0 0-1,0-1 17,0 19-17,0-19-15,0 1 31,0-1 1,-18 1-17,18 0 1,-17-1 0</inkml:trace>
+  <inkml:trace contextRef="#ctx0" brushRef="#br0" timeOffset="3138.36">16439 10460 0,'18'0'47,"0"0"0,-1 0-31,1 17-16,0 1 31,-1-18-15,1 18-16,-18-1 15,18-17 1,-18 18-16,17 0 16,1-1-1,-18 1 1,17-18-16,1 35 15,0-17-15,-18 17 16,0 0-16,0 36 16,0-36-16,0 1 15,0-19-15,0 1 16,0-1 0,0 1-16,0 0 15,0 17 1,0 0-1,0-17 1,0 17-16,-18 36 16,18-54-1,-18 36-15,1-35 16,17 0-16,0-1 0,-18 1 16,1 17-1,-1-17 1,0-1-1,1 1 1,-1 0-16,0-1 16,1 1-1,-19-18-15,19 18 16,-1-18 15,-17 17-15,17-17 15,1 0-15,-1 0-1,0 0-15,1 0 16,-36 0 0,17 0-1,19 0 1,-1 0-1,1 0 1,-19 0 0,19 0-16,-1 0 0,18-17 31,0-19 47,0 19-78,0-1 16,18-17-16,-1 17 15,1 1-15,0-1 32,-1 18-32,1-18 15,17 18 1,-17-17-16,-1-1 15,1 18 1,17 0-16,-17-18 0,0 18 16,-1-17-16,19 17 15,-19 0 1,18-36 0,-17 19-16,35-1 15,-35 18 1,-1 0 15,1 0-15,0 0 15,17 0-15,-18 0-1,1 0 1,0 0-1,-1 0 1,1 0 0,0 0-1,-1 18 1,1 35 0,0-53-1,-1 17-15,-17 1 16,0 17 15,0-17-15,35 0-16,-35-1 15,0 1 1,18-18-16,-18 17 47,0 1-32,0 0 17,0-1 30</inkml:trace>
+  <inkml:trace contextRef="#ctx0" brushRef="#br0" timeOffset="5142.32">17286 10513 0,'0'35'78,"0"0"-62,0-17-16,0 0 15,0 52-15,0-52 16,0 35-16,0-18 16,0 0-16,0-17 15,0 0-15,0 34 16,0-34-16,0 17 15,0-17-15,0 17 16,0-17 0,18 17-1,-18-17 1,17-18 62,1 0-62,0 0-16,-1 0 0,1-18 47,35 1-32,-36 17 1,1 0-16,-18-18 15,18 18-15,-1 0 16,1 0-16,17 0 16,18-18-1,-35 18 1,0 0-16,17-17 16,0 17-1</inkml:trace>
+  <inkml:trace contextRef="#ctx0" brushRef="#br0" timeOffset="6442.24">17586 10513 0,'0'35'31,"-18"-17"-15,18 35-16,-17-36 0,17 19 15,0-19 1,0 54-16,0-36 15,0 0-15,0-17 16,0 35-16,0-18 16,0 0-16,0 18 15,0-35-15,0 17 16,0-17 0,0-1-16,0 1 0,0 0 15,0-1-15,0 19 16,0-19-1,0 1-15,0 0 16,0-1 0,0 19-1,0-19 1,0 1 0,0 17-1,0-17 16,0-1-15,0 1 0,0 0-1,0 17 32,0-17-31,0-1-1,0 1 1,0-1 0,0 19 15,0-19 16,17-17-16,1 0-15</inkml:trace>
+  <inkml:trace contextRef="#ctx0" brushRef="#br0" timeOffset="14873.95">16087 12206 0,'-18'-18'16,"0"18"-1,1 18 1,-1 17 0,18-17-1,0 0-15,0 17 16,0-17-16,0 34 16,0-34-1,0 17-15,0-17 0,0 17 16,0-17-1,0 0-15,0-1 16,0 19-16,0-19 16,0 1-1,0 17-15,0-17 0,0-1 16,0 1 15,0 53-15,0-54-16,0 1 15,0-1-15,0 1 16,0 0 0,0-1-1,0 1-15,18 0 32,-18-54 93,0 19-110,0-1-15,0-17 0,0 17 16,17-17-1,1 17 1,0 1 0,-18-1-16,35 0 0,-35 1 15,18 17 1,17-18 0,0-17-1,-17 35 1,-1-18-1,1 18 1,17-17 0,-17-1-16,0 18 15,17-18 1,-17 1 0,-1 17-1,1 0-15,-1 0 16,1-36-1,-18 19-15,0 52 110,35-17-95,-35-1 17,0 1-32,0 0 15,0-1-15,0 1 16,0-1-16,0 1 16,0 0-16,0 17 15,0-17 1,0-1-16,0 1 15,0 0 1,0-1-16,0 1 16,0-1-16,0 1 15,0 17 1,0-17 15,-17 0 32,-19-1-48,36 1 1,-52-18 0,34 0-16,18 18 15,-18-1-15,18 1 16,-17-18-1,-1 0 17,0 0-17,1 0-15,-1 0 32,0 0-17,1 0-15,-19 0 16,19 0-1,-1 0 1,1 0 140,-1 0-124,0 0-32,1-18 46</inkml:trace>
+  <inkml:trace contextRef="#ctx0" brushRef="#br0" timeOffset="15822.43">16775 12506 0,'0'18'47,"0"-1"-31,0 19-16,0-19 15,0 18 1,0-17 0,0 0-1,0-1-15,0 1 0,0 0 16,0-1-16,0 1 16,0 0-1,0-1 1,0 1-1,0-1-15,0 1 16,-18-18 0,18 18-1,-18-1 17,1-17-17,17 18 1</inkml:trace>
+  <inkml:trace contextRef="#ctx0" brushRef="#br0" timeOffset="16495.22">16704 12153 0</inkml:trace>
+  <inkml:trace contextRef="#ctx0" brushRef="#br0" timeOffset="17935.49">17392 11994 0,'18'0'47,"-18"18"-16,0 0-16,0 17 1,0 0-16,0 1 16,0 16-16,0-16 15,0-1-15,0 0 16,0-17-16,0 17 31,0-17-15,0 17-16,0-17 31,0 17-15,0-17 15,0 17 0,0-17 0,0-1-15,-18 19 0,0-19-16,18 1 15,-17 17 1,17-17 0,0-1-16,-18 1 15,18 0 32,-18-1-31,18 1 31,0 0-32,0-1 1,0 1 31,0-1-16,0 1 0</inkml:trace>
+  <inkml:trace contextRef="#ctx0" brushRef="#br0" timeOffset="18979.54">17004 12365 0,'0'0'0,"18"0"32,-1 0-17,1 0 32,-1 0-31,1 0-16,0 0 15,-1 0-15,19 0 16,-1 0-16,0 0 16,0 0-16,-17 0 15,35 0 1,-18 0-16,-17-18 0,35 18 15,-36-17-15,19 17 16,-19 0 0,19-18-16,-19 18 15,1 0-15,0 0 0,-1 0 16,1 0 0,17 0 124,-17 0-124,-1 0 15,1 0-15,0 0-1</inkml:trace>
+  <inkml:trace contextRef="#ctx0" brushRef="#br0" timeOffset="21026.01">18715 12330 0,'17'0'31,"1"0"-16,-18 17 1,-18-17 15,1 0-15,-1 0 15,-17 18-15,17-18-1,1 0-15,-1 17 16,0-17 0,-17 0-1,17 0-15,1 0 16,-1 0 0,1 0-1,-1 0-15,0 0 16,-17 0-16,17 0 15,-17 0-15,17 18 16,-17-18 0,0 18-16,-18-18 0,18 0 15,17 0-15,-17 0 16,17 0-16,0 0 16,1 0-1,17 17-15,0 1 188,35-18-157,-17 18-15,-1-18-16,1 0 15,17 17 1,-17-17-16,17 36 15,-17-36-15,0 0 32,17 0-17,0 0-15,-17 17 16,-1-17 0,1 0-1,0 18 1,-18 0-16,17-18 0,-17 17 15,18-17 1,-18 18 0,0-1-1,0 1 1,0 0-16,0-1 16,18-17-1,-18 18-15,0 0 16,0 17 15,0-17-15,0-1-1,0 1 1,0-1 15,0 1-15,0 0-1,-71 52 1,53-70 0,1 18-1,17 0-15,-36-1 0,19 1 16,-1-1 31,1 1-32,-1-18 1,-17 18-16,17-1 0,0 1 16,1 0-1,-1-18 1,0 0 46,1 0-15,-1 17 16,0-17-32,1 0-15,-1 0-1</inkml:trace>
+  <inkml:trace contextRef="#ctx0" brushRef="#br0" timeOffset="27882.86">16140 13688 0,'0'17'125,"0"1"-125,0 0 15,-18-1-15,0 1 16,-17 0-16,35-1 16,-18-17-16,18 18 15,-17 17 1,-1-35 0,18 18-16,-18-1 15,1 1 1,-1 17-16,1-35 15,-1 36 1,0-36-16,-17 17 0,17 1 16,1 0-1,17-1-15,-18-17 16,0 18 15,1-1-15,-1 1-1,-17 0 1,17-1-16,-17-17 16,0 36-1,17-36-15,0 17 16,1 19 15,-1-19-15,0 1-1,18-1-15,-17-17 32,17 18-17,0 0 32,-18-1 0,18 1 16,-17 0 30,-1-1-77,18 1 0,-18 0-16,18-1 31,-17 1-16,-1-18 32,18 18-31,-18-18 46,18 17-46,-17-17 0,-1 0-16,0 35 15,-17-35 1,18 18 0,-1 0 140,0-18-141</inkml:trace>
+  <inkml:trace contextRef="#ctx0" brushRef="#br0" timeOffset="30894.14">16175 13899 0,'0'-17'62,"17"-1"-46,1 1-16,0 17 15,17 0-15,-17-18 16,-1 18 15,1-35-31,-18 17 16,35 0-16,-17 18 16,0 0-1,-1 0 16,1 0 1,17 0-17,-17 0 1,-1 0-16,1 0 16,0 18-1,17 0 16,-17 17-15,-1-17 15,-17 17-31,18 0 16,-18 0 0,17-17-1,1 0-15,0-1 47,-18 1-31,0 0 15,0-1-15,0 1-1,0-1 16,0 1-15,0 17 0,0-17-1,-18-18-15,18 18 16,-18-18 0,1 17-16,-1-17 15,-35 18-15,36 0 16,-19-1-1,19 1 1,-19-18 0,1 0-1,18 0 17,-19 17-17,19-17 1,17 18-16,-18-18 15,0 0 1,1 0 0,-19 0 62,19 0-63,17-18-15,0 1 32,0-1-17,0 1 17,0-1 14,0 0-30,17 1 0,1-1-1,-18 0 1,18 1 0,-1 17 77,1 0-77,0 0-16,-1 0 16,1 0-16,0 0 15,34 0 1,-34 0-16,17 0 15,1 0 1,-19 0 0,1 0-16,0 0 15,-1 17 1,1 1 31,17-18-16,-35 18-31,18-18 16,-1 17-1,1 1 17,0-18-17,-18 18 16,0-1-15,0 1 0,0-1-16,35-17 15,-35 18-15,0 17 16,18-17 109</inkml:trace>
+  <inkml:trace contextRef="#ctx0" brushRef="#br0" timeOffset="34420.12">17480 13741 0,'-18'0'31,"1"0"-15,-18 0 0,17 0-16,0 0 15,1 0-15,-1 0 16,0 0-16,1 0 16,-1 0-16,0 0 15,1 0-15,-18 0 16,17 17-16,-35-17 15,18 0 1,17 18 0,0-18-16,1 0 15,17 18 1,-35-18-16,17 0 16,-17 17 15,17-17-16,0 18-15,-17-18 0,35 18 16,-18-1-16,18 1 16,-17-18-1,-1 35 63,18-17-78,0 17 94,0-17-78,0-1-1,18-17 1,-1 0-16,19 18 31,-19-18-15,1 0 0,-18 18-1,18-1-15,17-17 16,0 18-1,0-18 1,1 35 0,-19-35-1,1 0-15,0 18 16,-1-18 0,1 0-1,0 0-15,-1 0 16,1 0-1,-18 17-15,17-17 16,-17 18 62,36-18-62,-19 0-1,-17 18-15,18-18 16,53 53 0,-71-36-16,35 1 0,-18-1 15,-17 1 1,18 0 0,0-1 15,-18 1 31,0 0-46,0-1 0,0 1-1,0 0 1,0-1 62,0 1-62,-18 0-1,0-18 16,1 17 48,-1-17-64,1 0 1,-1 0-1,-35 18-15,35-18 16,1 0 0,-36 0-16,18 17 15,-1-17-15,1 0 16,17 0-16,-17 18 16,17-18-1,1 0 16,-1 0-15,1 0 0,-1 0 31,18-18 78,0 1-110,0-18 1,0 17 15,0 0-15,0 1-1,0-1 1,0 0 0,0 1-1,0-1 1,0 0-1,0 1 1,18 17-16,-18-18 0,0 0 31,17 1-15,1-1-16,-18 1 0,0-19 47,17 19-32,1 17 1,0-18-16,-1 0 16,1 18-1,-18-17 1,35-19 0,-17 19-1,-18-1 1,35 18 15,-35-17 16,18 17-31,-18-18 15,17 18-16,-17-18 32,18 1-31,0-1 15,-18 0 0,17-17-15,1 35 0,0-35-16,-18 17 0,0 1 15,17-1 17,-17 0 14,18 1-14,-18-1-1,18 0 47</inkml:trace>
+</inkml:ink>
+</file>
+
 <file path=ppt/slideLayouts/slideLayout1.xml><?xml version="1.0" encoding="utf-8"?>
 <p:sldLayout xmlns:a="http://schemas.openxmlformats.org/drawingml/2006/main" xmlns:r="http://schemas.openxmlformats.org/officeDocument/2006/relationships" xmlns:p="http://schemas.openxmlformats.org/presentationml/2006/main" type="title" preserve="1">
   <p:cSld name="Title Slide">
@@ -269,7 +367,7 @@
           <a:p>
             <a:fld id="{4C3703C5-6A2F-48D9-A9AD-1A8D40C42F8C}" type="datetimeFigureOut">
               <a:rPr lang="en-US" smtClean="0"/>
-              <a:t>12/8/2020</a:t>
+              <a:t>12/9/2020</a:t>
             </a:fld>
             <a:endParaRPr lang="en-US"/>
           </a:p>
@@ -467,7 +565,7 @@
           <a:p>
             <a:fld id="{4C3703C5-6A2F-48D9-A9AD-1A8D40C42F8C}" type="datetimeFigureOut">
               <a:rPr lang="en-US" smtClean="0"/>
-              <a:t>12/8/2020</a:t>
+              <a:t>12/9/2020</a:t>
             </a:fld>
             <a:endParaRPr lang="en-US"/>
           </a:p>
@@ -675,7 +773,7 @@
           <a:p>
             <a:fld id="{4C3703C5-6A2F-48D9-A9AD-1A8D40C42F8C}" type="datetimeFigureOut">
               <a:rPr lang="en-US" smtClean="0"/>
-              <a:t>12/8/2020</a:t>
+              <a:t>12/9/2020</a:t>
             </a:fld>
             <a:endParaRPr lang="en-US"/>
           </a:p>
@@ -873,7 +971,7 @@
           <a:p>
             <a:fld id="{4C3703C5-6A2F-48D9-A9AD-1A8D40C42F8C}" type="datetimeFigureOut">
               <a:rPr lang="en-US" smtClean="0"/>
-              <a:t>12/8/2020</a:t>
+              <a:t>12/9/2020</a:t>
             </a:fld>
             <a:endParaRPr lang="en-US"/>
           </a:p>
@@ -1148,7 +1246,7 @@
           <a:p>
             <a:fld id="{4C3703C5-6A2F-48D9-A9AD-1A8D40C42F8C}" type="datetimeFigureOut">
               <a:rPr lang="en-US" smtClean="0"/>
-              <a:t>12/8/2020</a:t>
+              <a:t>12/9/2020</a:t>
             </a:fld>
             <a:endParaRPr lang="en-US"/>
           </a:p>
@@ -1413,7 +1511,7 @@
           <a:p>
             <a:fld id="{4C3703C5-6A2F-48D9-A9AD-1A8D40C42F8C}" type="datetimeFigureOut">
               <a:rPr lang="en-US" smtClean="0"/>
-              <a:t>12/8/2020</a:t>
+              <a:t>12/9/2020</a:t>
             </a:fld>
             <a:endParaRPr lang="en-US"/>
           </a:p>
@@ -1825,7 +1923,7 @@
           <a:p>
             <a:fld id="{4C3703C5-6A2F-48D9-A9AD-1A8D40C42F8C}" type="datetimeFigureOut">
               <a:rPr lang="en-US" smtClean="0"/>
-              <a:t>12/8/2020</a:t>
+              <a:t>12/9/2020</a:t>
             </a:fld>
             <a:endParaRPr lang="en-US"/>
           </a:p>
@@ -1966,7 +2064,7 @@
           <a:p>
             <a:fld id="{4C3703C5-6A2F-48D9-A9AD-1A8D40C42F8C}" type="datetimeFigureOut">
               <a:rPr lang="en-US" smtClean="0"/>
-              <a:t>12/8/2020</a:t>
+              <a:t>12/9/2020</a:t>
             </a:fld>
             <a:endParaRPr lang="en-US"/>
           </a:p>
@@ -2079,7 +2177,7 @@
           <a:p>
             <a:fld id="{4C3703C5-6A2F-48D9-A9AD-1A8D40C42F8C}" type="datetimeFigureOut">
               <a:rPr lang="en-US" smtClean="0"/>
-              <a:t>12/8/2020</a:t>
+              <a:t>12/9/2020</a:t>
             </a:fld>
             <a:endParaRPr lang="en-US"/>
           </a:p>
@@ -2390,7 +2488,7 @@
           <a:p>
             <a:fld id="{4C3703C5-6A2F-48D9-A9AD-1A8D40C42F8C}" type="datetimeFigureOut">
               <a:rPr lang="en-US" smtClean="0"/>
-              <a:t>12/8/2020</a:t>
+              <a:t>12/9/2020</a:t>
             </a:fld>
             <a:endParaRPr lang="en-US"/>
           </a:p>
@@ -2678,7 +2776,7 @@
           <a:p>
             <a:fld id="{4C3703C5-6A2F-48D9-A9AD-1A8D40C42F8C}" type="datetimeFigureOut">
               <a:rPr lang="en-US" smtClean="0"/>
-              <a:t>12/8/2020</a:t>
+              <a:t>12/9/2020</a:t>
             </a:fld>
             <a:endParaRPr lang="en-US"/>
           </a:p>
@@ -2919,7 +3017,7 @@
           <a:p>
             <a:fld id="{4C3703C5-6A2F-48D9-A9AD-1A8D40C42F8C}" type="datetimeFigureOut">
               <a:rPr lang="en-US" smtClean="0"/>
-              <a:t>12/8/2020</a:t>
+              <a:t>12/9/2020</a:t>
             </a:fld>
             <a:endParaRPr lang="en-US"/>
           </a:p>
@@ -3424,6 +3522,119 @@
           <p:cNvPr id="2" name="Title 1">
             <a:extLst>
               <a:ext uri="{FF2B5EF4-FFF2-40B4-BE49-F238E27FC236}">
+                <a16:creationId xmlns:a16="http://schemas.microsoft.com/office/drawing/2014/main" id="{A228C185-E119-4BCE-B5F2-CBD0C9BC825F}"/>
+              </a:ext>
+            </a:extLst>
+          </p:cNvPr>
+          <p:cNvSpPr>
+            <a:spLocks noGrp="1"/>
+          </p:cNvSpPr>
+          <p:nvPr>
+            <p:ph type="title"/>
+          </p:nvPr>
+        </p:nvSpPr>
+        <p:spPr/>
+        <p:txBody>
+          <a:bodyPr/>
+          <a:lstStyle/>
+          <a:p>
+            <a:r>
+              <a:rPr lang="en-US" dirty="0"/>
+              <a:t>CIDR Notation</a:t>
+            </a:r>
+          </a:p>
+        </p:txBody>
+      </p:sp>
+      <p:sp>
+        <p:nvSpPr>
+          <p:cNvPr id="3" name="Content Placeholder 2">
+            <a:extLst>
+              <a:ext uri="{FF2B5EF4-FFF2-40B4-BE49-F238E27FC236}">
+                <a16:creationId xmlns:a16="http://schemas.microsoft.com/office/drawing/2014/main" id="{94EA3215-BD37-4075-A070-56C263E3C4B3}"/>
+              </a:ext>
+            </a:extLst>
+          </p:cNvPr>
+          <p:cNvSpPr>
+            <a:spLocks noGrp="1"/>
+          </p:cNvSpPr>
+          <p:nvPr>
+            <p:ph idx="1"/>
+          </p:nvPr>
+        </p:nvSpPr>
+        <p:spPr/>
+        <p:txBody>
+          <a:bodyPr/>
+          <a:lstStyle/>
+          <a:p>
+            <a:pPr marL="0" indent="0">
+              <a:buNone/>
+            </a:pPr>
+            <a:r>
+              <a:rPr lang="en-US" dirty="0"/>
+              <a:t>Classless Inter-Domain Routing</a:t>
+            </a:r>
+          </a:p>
+          <a:p>
+            <a:pPr>
+              <a:buFontTx/>
+              <a:buChar char="-"/>
+            </a:pPr>
+            <a:r>
+              <a:rPr lang="en-US" dirty="0"/>
+              <a:t>Break from A, B, and C classes.</a:t>
+            </a:r>
+          </a:p>
+          <a:p>
+            <a:pPr>
+              <a:buFontTx/>
+              <a:buChar char="-"/>
+            </a:pPr>
+            <a:r>
+              <a:rPr lang="en-US" dirty="0" err="1"/>
+              <a:t>x.x.x.x</a:t>
+            </a:r>
+            <a:r>
+              <a:rPr lang="en-US" dirty="0"/>
+              <a:t>/y</a:t>
+            </a:r>
+          </a:p>
+        </p:txBody>
+      </p:sp>
+    </p:spTree>
+    <p:extLst>
+      <p:ext uri="{BB962C8B-B14F-4D97-AF65-F5344CB8AC3E}">
+        <p14:creationId xmlns:p14="http://schemas.microsoft.com/office/powerpoint/2010/main" val="2952225522"/>
+      </p:ext>
+    </p:extLst>
+  </p:cSld>
+  <p:clrMapOvr>
+    <a:masterClrMapping/>
+  </p:clrMapOvr>
+</p:sld>
+</file>
+
+<file path=ppt/slides/slide11.xml><?xml version="1.0" encoding="utf-8"?>
+<p:sld xmlns:a="http://schemas.openxmlformats.org/drawingml/2006/main" xmlns:r="http://schemas.openxmlformats.org/officeDocument/2006/relationships" xmlns:p="http://schemas.openxmlformats.org/presentationml/2006/main">
+  <p:cSld>
+    <p:spTree>
+      <p:nvGrpSpPr>
+        <p:cNvPr id="1" name=""/>
+        <p:cNvGrpSpPr/>
+        <p:nvPr/>
+      </p:nvGrpSpPr>
+      <p:grpSpPr>
+        <a:xfrm>
+          <a:off x="0" y="0"/>
+          <a:ext cx="0" cy="0"/>
+          <a:chOff x="0" y="0"/>
+          <a:chExt cx="0" cy="0"/>
+        </a:xfrm>
+      </p:grpSpPr>
+      <p:sp>
+        <p:nvSpPr>
+          <p:cNvPr id="2" name="Title 1">
+            <a:extLst>
+              <a:ext uri="{FF2B5EF4-FFF2-40B4-BE49-F238E27FC236}">
                 <a16:creationId xmlns:a16="http://schemas.microsoft.com/office/drawing/2014/main" id="{DA9A995D-B171-4A24-BA48-3A7CDA778E08}"/>
               </a:ext>
             </a:extLst>
@@ -3559,7 +3770,7 @@
 </p:sld>
 </file>
 
-<file path=ppt/slides/slide11.xml><?xml version="1.0" encoding="utf-8"?>
+<file path=ppt/slides/slide12.xml><?xml version="1.0" encoding="utf-8"?>
 <p:sld xmlns:a="http://schemas.openxmlformats.org/drawingml/2006/main" xmlns:r="http://schemas.openxmlformats.org/officeDocument/2006/relationships" xmlns:p="http://schemas.openxmlformats.org/presentationml/2006/main">
   <p:cSld>
     <p:spTree>
@@ -4379,6 +4590,141 @@
           <p:cNvPr id="2" name="Title 1">
             <a:extLst>
               <a:ext uri="{FF2B5EF4-FFF2-40B4-BE49-F238E27FC236}">
+                <a16:creationId xmlns:a16="http://schemas.microsoft.com/office/drawing/2014/main" id="{7878970C-0B68-4AD5-9C93-713742D0DCCE}"/>
+              </a:ext>
+            </a:extLst>
+          </p:cNvPr>
+          <p:cNvSpPr>
+            <a:spLocks noGrp="1"/>
+          </p:cNvSpPr>
+          <p:nvPr>
+            <p:ph type="title"/>
+          </p:nvPr>
+        </p:nvSpPr>
+        <p:spPr/>
+        <p:txBody>
+          <a:bodyPr/>
+          <a:lstStyle/>
+          <a:p>
+            <a:endParaRPr lang="en-US"/>
+          </a:p>
+        </p:txBody>
+      </p:sp>
+      <p:pic>
+        <p:nvPicPr>
+          <p:cNvPr id="5" name="Content Placeholder 4">
+            <a:extLst>
+              <a:ext uri="{FF2B5EF4-FFF2-40B4-BE49-F238E27FC236}">
+                <a16:creationId xmlns:a16="http://schemas.microsoft.com/office/drawing/2014/main" id="{9C0B145B-04AC-4C3F-8114-D7FD7E37133F}"/>
+              </a:ext>
+            </a:extLst>
+          </p:cNvPr>
+          <p:cNvPicPr>
+            <a:picLocks noGrp="1" noChangeAspect="1"/>
+          </p:cNvPicPr>
+          <p:nvPr>
+            <p:ph idx="1"/>
+          </p:nvPr>
+        </p:nvPicPr>
+        <p:blipFill>
+          <a:blip r:embed="rId2"/>
+          <a:stretch>
+            <a:fillRect/>
+          </a:stretch>
+        </p:blipFill>
+        <p:spPr>
+          <a:xfrm>
+            <a:off x="2340502" y="1825625"/>
+            <a:ext cx="7510995" cy="4351338"/>
+          </a:xfrm>
+        </p:spPr>
+      </p:pic>
+      <mc:AlternateContent xmlns:mc="http://schemas.openxmlformats.org/markup-compatibility/2006">
+        <mc:Choice xmlns:p14="http://schemas.microsoft.com/office/powerpoint/2010/main" Requires="p14">
+          <p:contentPart p14:bwMode="auto" r:id="rId3">
+            <p14:nvContentPartPr>
+              <p14:cNvPr id="6" name="Ink 5">
+                <a:extLst>
+                  <a:ext uri="{FF2B5EF4-FFF2-40B4-BE49-F238E27FC236}">
+                    <a16:creationId xmlns:a16="http://schemas.microsoft.com/office/drawing/2014/main" id="{5CEE9BB5-4AFE-474C-9C7B-717D88A9F32B}"/>
+                  </a:ext>
+                </a:extLst>
+              </p14:cNvPr>
+              <p14:cNvContentPartPr/>
+              <p14:nvPr/>
+            </p14:nvContentPartPr>
+            <p14:xfrm>
+              <a:off x="946080" y="342720"/>
+              <a:ext cx="2883240" cy="3213720"/>
+            </p14:xfrm>
+          </p:contentPart>
+        </mc:Choice>
+        <mc:Fallback>
+          <p:pic>
+            <p:nvPicPr>
+              <p:cNvPr id="6" name="Ink 5">
+                <a:extLst>
+                  <a:ext uri="{FF2B5EF4-FFF2-40B4-BE49-F238E27FC236}">
+                    <a16:creationId xmlns:a16="http://schemas.microsoft.com/office/drawing/2014/main" id="{5CEE9BB5-4AFE-474C-9C7B-717D88A9F32B}"/>
+                  </a:ext>
+                </a:extLst>
+              </p:cNvPr>
+              <p:cNvPicPr/>
+              <p:nvPr/>
+            </p:nvPicPr>
+            <p:blipFill>
+              <a:blip r:embed="rId4"/>
+              <a:stretch>
+                <a:fillRect/>
+              </a:stretch>
+            </p:blipFill>
+            <p:spPr>
+              <a:xfrm>
+                <a:off x="936720" y="333360"/>
+                <a:ext cx="2901960" cy="3232440"/>
+              </a:xfrm>
+              <a:prstGeom prst="rect">
+                <a:avLst/>
+              </a:prstGeom>
+            </p:spPr>
+          </p:pic>
+        </mc:Fallback>
+      </mc:AlternateContent>
+    </p:spTree>
+    <p:extLst>
+      <p:ext uri="{BB962C8B-B14F-4D97-AF65-F5344CB8AC3E}">
+        <p14:creationId xmlns:p14="http://schemas.microsoft.com/office/powerpoint/2010/main" val="1044909094"/>
+      </p:ext>
+    </p:extLst>
+  </p:cSld>
+  <p:clrMapOvr>
+    <a:masterClrMapping/>
+  </p:clrMapOvr>
+</p:sld>
+</file>
+
+<file path=ppt/slides/slide7.xml><?xml version="1.0" encoding="utf-8"?>
+<p:sld xmlns:a="http://schemas.openxmlformats.org/drawingml/2006/main" xmlns:r="http://schemas.openxmlformats.org/officeDocument/2006/relationships" xmlns:p="http://schemas.openxmlformats.org/presentationml/2006/main">
+  <p:cSld>
+    <p:spTree>
+      <p:nvGrpSpPr>
+        <p:cNvPr id="1" name=""/>
+        <p:cNvGrpSpPr/>
+        <p:nvPr/>
+      </p:nvGrpSpPr>
+      <p:grpSpPr>
+        <a:xfrm>
+          <a:off x="0" y="0"/>
+          <a:ext cx="0" cy="0"/>
+          <a:chOff x="0" y="0"/>
+          <a:chExt cx="0" cy="0"/>
+        </a:xfrm>
+      </p:grpSpPr>
+      <p:sp>
+        <p:nvSpPr>
+          <p:cNvPr id="2" name="Title 1">
+            <a:extLst>
+              <a:ext uri="{FF2B5EF4-FFF2-40B4-BE49-F238E27FC236}">
                 <a16:creationId xmlns:a16="http://schemas.microsoft.com/office/drawing/2014/main" id="{304AC016-6607-4E44-8066-57F2DA5AFDBE}"/>
               </a:ext>
             </a:extLst>
@@ -4501,7 +4847,7 @@
 </p:sld>
 </file>
 
-<file path=ppt/slides/slide7.xml><?xml version="1.0" encoding="utf-8"?>
+<file path=ppt/slides/slide8.xml><?xml version="1.0" encoding="utf-8"?>
 <p:sld xmlns:a="http://schemas.openxmlformats.org/drawingml/2006/main" xmlns:r="http://schemas.openxmlformats.org/officeDocument/2006/relationships" xmlns:p="http://schemas.openxmlformats.org/presentationml/2006/main">
   <p:cSld>
     <p:spTree>
@@ -4728,6 +5074,57 @@
           </a:graphicData>
         </a:graphic>
       </p:graphicFrame>
+      <mc:AlternateContent xmlns:mc="http://schemas.openxmlformats.org/markup-compatibility/2006">
+        <mc:Choice xmlns:p14="http://schemas.microsoft.com/office/powerpoint/2010/main" Requires="p14">
+          <p:contentPart p14:bwMode="auto" r:id="rId2">
+            <p14:nvContentPartPr>
+              <p14:cNvPr id="3" name="Ink 2">
+                <a:extLst>
+                  <a:ext uri="{FF2B5EF4-FFF2-40B4-BE49-F238E27FC236}">
+                    <a16:creationId xmlns:a16="http://schemas.microsoft.com/office/drawing/2014/main" id="{7441EB98-BA58-4C97-83F4-D34BEC2597F6}"/>
+                  </a:ext>
+                </a:extLst>
+              </p14:cNvPr>
+              <p14:cNvContentPartPr/>
+              <p14:nvPr/>
+            </p14:nvContentPartPr>
+            <p14:xfrm>
+              <a:off x="5499000" y="3664080"/>
+              <a:ext cx="1251360" cy="1581480"/>
+            </p14:xfrm>
+          </p:contentPart>
+        </mc:Choice>
+        <mc:Fallback>
+          <p:pic>
+            <p:nvPicPr>
+              <p:cNvPr id="3" name="Ink 2">
+                <a:extLst>
+                  <a:ext uri="{FF2B5EF4-FFF2-40B4-BE49-F238E27FC236}">
+                    <a16:creationId xmlns:a16="http://schemas.microsoft.com/office/drawing/2014/main" id="{7441EB98-BA58-4C97-83F4-D34BEC2597F6}"/>
+                  </a:ext>
+                </a:extLst>
+              </p:cNvPr>
+              <p:cNvPicPr/>
+              <p:nvPr/>
+            </p:nvPicPr>
+            <p:blipFill>
+              <a:blip r:embed="rId3"/>
+              <a:stretch>
+                <a:fillRect/>
+              </a:stretch>
+            </p:blipFill>
+            <p:spPr>
+              <a:xfrm>
+                <a:off x="5489640" y="3654720"/>
+                <a:ext cx="1270080" cy="1600200"/>
+              </a:xfrm>
+              <a:prstGeom prst="rect">
+                <a:avLst/>
+              </a:prstGeom>
+            </p:spPr>
+          </p:pic>
+        </mc:Fallback>
+      </mc:AlternateContent>
     </p:spTree>
     <p:extLst>
       <p:ext uri="{BB962C8B-B14F-4D97-AF65-F5344CB8AC3E}">
@@ -4741,7 +5138,7 @@
 </p:sld>
 </file>
 
-<file path=ppt/slides/slide8.xml><?xml version="1.0" encoding="utf-8"?>
+<file path=ppt/slides/slide9.xml><?xml version="1.0" encoding="utf-8"?>
 <p:sld xmlns:a="http://schemas.openxmlformats.org/drawingml/2006/main" xmlns:r="http://schemas.openxmlformats.org/officeDocument/2006/relationships" xmlns:p="http://schemas.openxmlformats.org/presentationml/2006/main">
   <p:cSld>
     <p:spTree>
@@ -5224,119 +5621,6 @@
     <p:extLst>
       <p:ext uri="{BB962C8B-B14F-4D97-AF65-F5344CB8AC3E}">
         <p14:creationId xmlns:p14="http://schemas.microsoft.com/office/powerpoint/2010/main" val="753893749"/>
-      </p:ext>
-    </p:extLst>
-  </p:cSld>
-  <p:clrMapOvr>
-    <a:masterClrMapping/>
-  </p:clrMapOvr>
-</p:sld>
-</file>
-
-<file path=ppt/slides/slide9.xml><?xml version="1.0" encoding="utf-8"?>
-<p:sld xmlns:a="http://schemas.openxmlformats.org/drawingml/2006/main" xmlns:r="http://schemas.openxmlformats.org/officeDocument/2006/relationships" xmlns:p="http://schemas.openxmlformats.org/presentationml/2006/main">
-  <p:cSld>
-    <p:spTree>
-      <p:nvGrpSpPr>
-        <p:cNvPr id="1" name=""/>
-        <p:cNvGrpSpPr/>
-        <p:nvPr/>
-      </p:nvGrpSpPr>
-      <p:grpSpPr>
-        <a:xfrm>
-          <a:off x="0" y="0"/>
-          <a:ext cx="0" cy="0"/>
-          <a:chOff x="0" y="0"/>
-          <a:chExt cx="0" cy="0"/>
-        </a:xfrm>
-      </p:grpSpPr>
-      <p:sp>
-        <p:nvSpPr>
-          <p:cNvPr id="2" name="Title 1">
-            <a:extLst>
-              <a:ext uri="{FF2B5EF4-FFF2-40B4-BE49-F238E27FC236}">
-                <a16:creationId xmlns:a16="http://schemas.microsoft.com/office/drawing/2014/main" id="{A228C185-E119-4BCE-B5F2-CBD0C9BC825F}"/>
-              </a:ext>
-            </a:extLst>
-          </p:cNvPr>
-          <p:cNvSpPr>
-            <a:spLocks noGrp="1"/>
-          </p:cNvSpPr>
-          <p:nvPr>
-            <p:ph type="title"/>
-          </p:nvPr>
-        </p:nvSpPr>
-        <p:spPr/>
-        <p:txBody>
-          <a:bodyPr/>
-          <a:lstStyle/>
-          <a:p>
-            <a:r>
-              <a:rPr lang="en-US" dirty="0"/>
-              <a:t>CIDR Notation</a:t>
-            </a:r>
-          </a:p>
-        </p:txBody>
-      </p:sp>
-      <p:sp>
-        <p:nvSpPr>
-          <p:cNvPr id="3" name="Content Placeholder 2">
-            <a:extLst>
-              <a:ext uri="{FF2B5EF4-FFF2-40B4-BE49-F238E27FC236}">
-                <a16:creationId xmlns:a16="http://schemas.microsoft.com/office/drawing/2014/main" id="{94EA3215-BD37-4075-A070-56C263E3C4B3}"/>
-              </a:ext>
-            </a:extLst>
-          </p:cNvPr>
-          <p:cNvSpPr>
-            <a:spLocks noGrp="1"/>
-          </p:cNvSpPr>
-          <p:nvPr>
-            <p:ph idx="1"/>
-          </p:nvPr>
-        </p:nvSpPr>
-        <p:spPr/>
-        <p:txBody>
-          <a:bodyPr/>
-          <a:lstStyle/>
-          <a:p>
-            <a:pPr marL="0" indent="0">
-              <a:buNone/>
-            </a:pPr>
-            <a:r>
-              <a:rPr lang="en-US" dirty="0"/>
-              <a:t>Classless Inter-Domain Routing</a:t>
-            </a:r>
-          </a:p>
-          <a:p>
-            <a:pPr>
-              <a:buFontTx/>
-              <a:buChar char="-"/>
-            </a:pPr>
-            <a:r>
-              <a:rPr lang="en-US" dirty="0"/>
-              <a:t>Break from A, B, and C classes.</a:t>
-            </a:r>
-          </a:p>
-          <a:p>
-            <a:pPr>
-              <a:buFontTx/>
-              <a:buChar char="-"/>
-            </a:pPr>
-            <a:r>
-              <a:rPr lang="en-US" dirty="0" err="1"/>
-              <a:t>x.x.x.x</a:t>
-            </a:r>
-            <a:r>
-              <a:rPr lang="en-US" dirty="0"/>
-              <a:t>/y</a:t>
-            </a:r>
-          </a:p>
-        </p:txBody>
-      </p:sp>
-    </p:spTree>
-    <p:extLst>
-      <p:ext uri="{BB962C8B-B14F-4D97-AF65-F5344CB8AC3E}">
-        <p14:creationId xmlns:p14="http://schemas.microsoft.com/office/powerpoint/2010/main" val="2952225522"/>
       </p:ext>
     </p:extLst>
   </p:cSld>

</xml_diff>